<commit_message>
temoa_stochastic - added EmissionLimitMultiplier
Revised va_stoch scenarios to focus on EmissionLimitMultiplier
</commit_message>
<xml_diff>
--- a/projects/va_stoch/data/scenario_tree.pptx
+++ b/projects/va_stoch/data/scenario_tree.pptx
@@ -5,8 +5,9 @@
     <p:sldMasterId id="2147483660" r:id="rId1"/>
   </p:sldMasterIdLst>
   <p:sldIdLst>
-    <p:sldId id="260" r:id="rId2"/>
-    <p:sldId id="261" r:id="rId3"/>
+    <p:sldId id="262" r:id="rId2"/>
+    <p:sldId id="260" r:id="rId3"/>
+    <p:sldId id="261" r:id="rId4"/>
   </p:sldIdLst>
   <p:sldSz cx="12192000" cy="13716000"/>
   <p:notesSz cx="6858000" cy="9144000"/>
@@ -244,7 +245,7 @@
           <a:p>
             <a:fld id="{08280849-3BE6-4D23-AD50-FFE66DC3DEBB}" type="datetimeFigureOut">
               <a:rPr lang="en-US" smtClean="0"/>
-              <a:t>2/1/2021</a:t>
+              <a:t>2/2/2021</a:t>
             </a:fld>
             <a:endParaRPr lang="en-US"/>
           </a:p>
@@ -414,7 +415,7 @@
           <a:p>
             <a:fld id="{08280849-3BE6-4D23-AD50-FFE66DC3DEBB}" type="datetimeFigureOut">
               <a:rPr lang="en-US" smtClean="0"/>
-              <a:t>2/1/2021</a:t>
+              <a:t>2/2/2021</a:t>
             </a:fld>
             <a:endParaRPr lang="en-US"/>
           </a:p>
@@ -594,7 +595,7 @@
           <a:p>
             <a:fld id="{08280849-3BE6-4D23-AD50-FFE66DC3DEBB}" type="datetimeFigureOut">
               <a:rPr lang="en-US" smtClean="0"/>
-              <a:t>2/1/2021</a:t>
+              <a:t>2/2/2021</a:t>
             </a:fld>
             <a:endParaRPr lang="en-US"/>
           </a:p>
@@ -764,7 +765,7 @@
           <a:p>
             <a:fld id="{08280849-3BE6-4D23-AD50-FFE66DC3DEBB}" type="datetimeFigureOut">
               <a:rPr lang="en-US" smtClean="0"/>
-              <a:t>2/1/2021</a:t>
+              <a:t>2/2/2021</a:t>
             </a:fld>
             <a:endParaRPr lang="en-US"/>
           </a:p>
@@ -1008,7 +1009,7 @@
           <a:p>
             <a:fld id="{08280849-3BE6-4D23-AD50-FFE66DC3DEBB}" type="datetimeFigureOut">
               <a:rPr lang="en-US" smtClean="0"/>
-              <a:t>2/1/2021</a:t>
+              <a:t>2/2/2021</a:t>
             </a:fld>
             <a:endParaRPr lang="en-US"/>
           </a:p>
@@ -1240,7 +1241,7 @@
           <a:p>
             <a:fld id="{08280849-3BE6-4D23-AD50-FFE66DC3DEBB}" type="datetimeFigureOut">
               <a:rPr lang="en-US" smtClean="0"/>
-              <a:t>2/1/2021</a:t>
+              <a:t>2/2/2021</a:t>
             </a:fld>
             <a:endParaRPr lang="en-US"/>
           </a:p>
@@ -1607,7 +1608,7 @@
           <a:p>
             <a:fld id="{08280849-3BE6-4D23-AD50-FFE66DC3DEBB}" type="datetimeFigureOut">
               <a:rPr lang="en-US" smtClean="0"/>
-              <a:t>2/1/2021</a:t>
+              <a:t>2/2/2021</a:t>
             </a:fld>
             <a:endParaRPr lang="en-US"/>
           </a:p>
@@ -1725,7 +1726,7 @@
           <a:p>
             <a:fld id="{08280849-3BE6-4D23-AD50-FFE66DC3DEBB}" type="datetimeFigureOut">
               <a:rPr lang="en-US" smtClean="0"/>
-              <a:t>2/1/2021</a:t>
+              <a:t>2/2/2021</a:t>
             </a:fld>
             <a:endParaRPr lang="en-US"/>
           </a:p>
@@ -1820,7 +1821,7 @@
           <a:p>
             <a:fld id="{08280849-3BE6-4D23-AD50-FFE66DC3DEBB}" type="datetimeFigureOut">
               <a:rPr lang="en-US" smtClean="0"/>
-              <a:t>2/1/2021</a:t>
+              <a:t>2/2/2021</a:t>
             </a:fld>
             <a:endParaRPr lang="en-US"/>
           </a:p>
@@ -2097,7 +2098,7 @@
           <a:p>
             <a:fld id="{08280849-3BE6-4D23-AD50-FFE66DC3DEBB}" type="datetimeFigureOut">
               <a:rPr lang="en-US" smtClean="0"/>
-              <a:t>2/1/2021</a:t>
+              <a:t>2/2/2021</a:t>
             </a:fld>
             <a:endParaRPr lang="en-US"/>
           </a:p>
@@ -2354,7 +2355,7 @@
           <a:p>
             <a:fld id="{08280849-3BE6-4D23-AD50-FFE66DC3DEBB}" type="datetimeFigureOut">
               <a:rPr lang="en-US" smtClean="0"/>
-              <a:t>2/1/2021</a:t>
+              <a:t>2/2/2021</a:t>
             </a:fld>
             <a:endParaRPr lang="en-US"/>
           </a:p>
@@ -2567,7 +2568,7 @@
           <a:p>
             <a:fld id="{08280849-3BE6-4D23-AD50-FFE66DC3DEBB}" type="datetimeFigureOut">
               <a:rPr lang="en-US" smtClean="0"/>
-              <a:t>2/1/2021</a:t>
+              <a:t>2/2/2021</a:t>
             </a:fld>
             <a:endParaRPr lang="en-US"/>
           </a:p>
@@ -2956,6 +2957,2251 @@
 </file>
 
 <file path=ppt/slides/slide1.xml><?xml version="1.0" encoding="utf-8"?>
+<p:sld xmlns:a="http://schemas.openxmlformats.org/drawingml/2006/main" xmlns:r="http://schemas.openxmlformats.org/officeDocument/2006/relationships" xmlns:p="http://schemas.openxmlformats.org/presentationml/2006/main">
+  <p:cSld>
+    <p:spTree>
+      <p:nvGrpSpPr>
+        <p:cNvPr id="1" name=""/>
+        <p:cNvGrpSpPr/>
+        <p:nvPr/>
+      </p:nvGrpSpPr>
+      <p:grpSpPr>
+        <a:xfrm>
+          <a:off x="0" y="0"/>
+          <a:ext cx="0" cy="0"/>
+          <a:chOff x="0" y="0"/>
+          <a:chExt cx="0" cy="0"/>
+        </a:xfrm>
+      </p:grpSpPr>
+      <p:graphicFrame>
+        <p:nvGraphicFramePr>
+          <p:cNvPr id="36" name="Table 8">
+            <a:extLst>
+              <a:ext uri="{FF2B5EF4-FFF2-40B4-BE49-F238E27FC236}">
+                <a16:creationId xmlns:a16="http://schemas.microsoft.com/office/drawing/2014/main" id="{DF72EEE2-0760-4279-BC70-60A2B53FA1D7}"/>
+              </a:ext>
+            </a:extLst>
+          </p:cNvPr>
+          <p:cNvGraphicFramePr>
+            <a:graphicFrameLocks noGrp="1"/>
+          </p:cNvGraphicFramePr>
+          <p:nvPr/>
+        </p:nvGraphicFramePr>
+        <p:xfrm>
+          <a:off x="2852788" y="6542203"/>
+          <a:ext cx="3678308" cy="548640"/>
+        </p:xfrm>
+        <a:graphic>
+          <a:graphicData uri="http://schemas.openxmlformats.org/drawingml/2006/table">
+            <a:tbl>
+              <a:tblPr firstRow="1" bandRow="1"/>
+              <a:tblGrid>
+                <a:gridCol w="919577">
+                  <a:extLst>
+                    <a:ext uri="{9D8B030D-6E8A-4147-A177-3AD203B41FA5}">
+                      <a16:colId xmlns:a16="http://schemas.microsoft.com/office/drawing/2014/main" val="964288811"/>
+                    </a:ext>
+                  </a:extLst>
+                </a:gridCol>
+                <a:gridCol w="919577">
+                  <a:extLst>
+                    <a:ext uri="{9D8B030D-6E8A-4147-A177-3AD203B41FA5}">
+                      <a16:colId xmlns:a16="http://schemas.microsoft.com/office/drawing/2014/main" val="745732618"/>
+                    </a:ext>
+                  </a:extLst>
+                </a:gridCol>
+                <a:gridCol w="919577">
+                  <a:extLst>
+                    <a:ext uri="{9D8B030D-6E8A-4147-A177-3AD203B41FA5}">
+                      <a16:colId xmlns:a16="http://schemas.microsoft.com/office/drawing/2014/main" val="3445103048"/>
+                    </a:ext>
+                  </a:extLst>
+                </a:gridCol>
+                <a:gridCol w="919577">
+                  <a:extLst>
+                    <a:ext uri="{9D8B030D-6E8A-4147-A177-3AD203B41FA5}">
+                      <a16:colId xmlns:a16="http://schemas.microsoft.com/office/drawing/2014/main" val="3135562382"/>
+                    </a:ext>
+                  </a:extLst>
+                </a:gridCol>
+              </a:tblGrid>
+              <a:tr h="284111">
+                <a:tc>
+                  <a:txBody>
+                    <a:bodyPr/>
+                    <a:lstStyle/>
+                    <a:p>
+                      <a:pPr algn="ctr"/>
+                      <a:r>
+                        <a:rPr lang="en-US" sz="1500" dirty="0">
+                          <a:latin typeface="Arial" panose="020B0604020202020204" pitchFamily="34" charset="0"/>
+                          <a:cs typeface="Arial" panose="020B0604020202020204" pitchFamily="34" charset="0"/>
+                        </a:rPr>
+                        <a:t>2020</a:t>
+                      </a:r>
+                    </a:p>
+                    <a:p>
+                      <a:pPr algn="ctr"/>
+                      <a:r>
+                        <a:rPr lang="en-US" sz="1500" dirty="0">
+                          <a:latin typeface="Arial" panose="020B0604020202020204" pitchFamily="34" charset="0"/>
+                          <a:cs typeface="Arial" panose="020B0604020202020204" pitchFamily="34" charset="0"/>
+                        </a:rPr>
+                        <a:t>-2029</a:t>
+                      </a:r>
+                    </a:p>
+                  </a:txBody>
+                  <a:tcPr>
+                    <a:lnL w="12700" cap="flat" cmpd="sng" algn="ctr">
+                      <a:noFill/>
+                      <a:prstDash val="solid"/>
+                      <a:round/>
+                      <a:headEnd type="none" w="med" len="med"/>
+                      <a:tailEnd type="none" w="med" len="med"/>
+                    </a:lnL>
+                    <a:lnR w="12700" cap="flat" cmpd="sng" algn="ctr">
+                      <a:noFill/>
+                      <a:prstDash val="solid"/>
+                      <a:round/>
+                      <a:headEnd type="none" w="med" len="med"/>
+                      <a:tailEnd type="none" w="med" len="med"/>
+                    </a:lnR>
+                    <a:lnT w="12700" cap="flat" cmpd="sng" algn="ctr">
+                      <a:noFill/>
+                      <a:prstDash val="solid"/>
+                      <a:round/>
+                      <a:headEnd type="none" w="med" len="med"/>
+                      <a:tailEnd type="none" w="med" len="med"/>
+                    </a:lnT>
+                    <a:lnB w="12700" cap="flat" cmpd="sng" algn="ctr">
+                      <a:noFill/>
+                      <a:prstDash val="solid"/>
+                      <a:round/>
+                      <a:headEnd type="none" w="med" len="med"/>
+                      <a:tailEnd type="none" w="med" len="med"/>
+                    </a:lnB>
+                    <a:lnTlToBr w="12700" cmpd="sng">
+                      <a:noFill/>
+                      <a:prstDash val="solid"/>
+                    </a:lnTlToBr>
+                    <a:lnBlToTr w="12700" cmpd="sng">
+                      <a:noFill/>
+                      <a:prstDash val="solid"/>
+                    </a:lnBlToTr>
+                  </a:tcPr>
+                </a:tc>
+                <a:tc>
+                  <a:txBody>
+                    <a:bodyPr/>
+                    <a:lstStyle/>
+                    <a:p>
+                      <a:pPr algn="ctr"/>
+                      <a:r>
+                        <a:rPr lang="en-US" sz="1500" dirty="0">
+                          <a:latin typeface="Arial" panose="020B0604020202020204" pitchFamily="34" charset="0"/>
+                          <a:cs typeface="Arial" panose="020B0604020202020204" pitchFamily="34" charset="0"/>
+                        </a:rPr>
+                        <a:t>2030</a:t>
+                      </a:r>
+                    </a:p>
+                    <a:p>
+                      <a:pPr algn="ctr"/>
+                      <a:r>
+                        <a:rPr lang="en-US" sz="1500" dirty="0">
+                          <a:latin typeface="Arial" panose="020B0604020202020204" pitchFamily="34" charset="0"/>
+                          <a:cs typeface="Arial" panose="020B0604020202020204" pitchFamily="34" charset="0"/>
+                        </a:rPr>
+                        <a:t>-2039</a:t>
+                      </a:r>
+                    </a:p>
+                  </a:txBody>
+                  <a:tcPr>
+                    <a:lnL w="12700" cap="flat" cmpd="sng" algn="ctr">
+                      <a:noFill/>
+                      <a:prstDash val="solid"/>
+                      <a:round/>
+                      <a:headEnd type="none" w="med" len="med"/>
+                      <a:tailEnd type="none" w="med" len="med"/>
+                    </a:lnL>
+                    <a:lnR w="12700" cap="flat" cmpd="sng" algn="ctr">
+                      <a:noFill/>
+                      <a:prstDash val="solid"/>
+                      <a:round/>
+                      <a:headEnd type="none" w="med" len="med"/>
+                      <a:tailEnd type="none" w="med" len="med"/>
+                    </a:lnR>
+                    <a:lnT w="12700" cap="flat" cmpd="sng" algn="ctr">
+                      <a:noFill/>
+                      <a:prstDash val="solid"/>
+                      <a:round/>
+                      <a:headEnd type="none" w="med" len="med"/>
+                      <a:tailEnd type="none" w="med" len="med"/>
+                    </a:lnT>
+                    <a:lnB w="12700" cap="flat" cmpd="sng" algn="ctr">
+                      <a:noFill/>
+                      <a:prstDash val="solid"/>
+                      <a:round/>
+                      <a:headEnd type="none" w="med" len="med"/>
+                      <a:tailEnd type="none" w="med" len="med"/>
+                    </a:lnB>
+                    <a:lnTlToBr w="12700" cmpd="sng">
+                      <a:noFill/>
+                      <a:prstDash val="solid"/>
+                    </a:lnTlToBr>
+                    <a:lnBlToTr w="12700" cmpd="sng">
+                      <a:noFill/>
+                      <a:prstDash val="solid"/>
+                    </a:lnBlToTr>
+                  </a:tcPr>
+                </a:tc>
+                <a:tc>
+                  <a:txBody>
+                    <a:bodyPr/>
+                    <a:lstStyle/>
+                    <a:p>
+                      <a:pPr algn="ctr"/>
+                      <a:r>
+                        <a:rPr lang="en-US" sz="1500" dirty="0">
+                          <a:latin typeface="Arial" panose="020B0604020202020204" pitchFamily="34" charset="0"/>
+                          <a:cs typeface="Arial" panose="020B0604020202020204" pitchFamily="34" charset="0"/>
+                        </a:rPr>
+                        <a:t>2040</a:t>
+                      </a:r>
+                    </a:p>
+                    <a:p>
+                      <a:pPr algn="ctr"/>
+                      <a:r>
+                        <a:rPr lang="en-US" sz="1500" dirty="0">
+                          <a:latin typeface="Arial" panose="020B0604020202020204" pitchFamily="34" charset="0"/>
+                          <a:cs typeface="Arial" panose="020B0604020202020204" pitchFamily="34" charset="0"/>
+                        </a:rPr>
+                        <a:t>-2049</a:t>
+                      </a:r>
+                    </a:p>
+                  </a:txBody>
+                  <a:tcPr>
+                    <a:lnL w="12700" cap="flat" cmpd="sng" algn="ctr">
+                      <a:noFill/>
+                      <a:prstDash val="solid"/>
+                      <a:round/>
+                      <a:headEnd type="none" w="med" len="med"/>
+                      <a:tailEnd type="none" w="med" len="med"/>
+                    </a:lnL>
+                    <a:lnR w="12700" cap="flat" cmpd="sng" algn="ctr">
+                      <a:noFill/>
+                      <a:prstDash val="solid"/>
+                      <a:round/>
+                      <a:headEnd type="none" w="med" len="med"/>
+                      <a:tailEnd type="none" w="med" len="med"/>
+                    </a:lnR>
+                    <a:lnT w="12700" cap="flat" cmpd="sng" algn="ctr">
+                      <a:noFill/>
+                      <a:prstDash val="solid"/>
+                      <a:round/>
+                      <a:headEnd type="none" w="med" len="med"/>
+                      <a:tailEnd type="none" w="med" len="med"/>
+                    </a:lnT>
+                    <a:lnB w="12700" cap="flat" cmpd="sng" algn="ctr">
+                      <a:noFill/>
+                      <a:prstDash val="solid"/>
+                      <a:round/>
+                      <a:headEnd type="none" w="med" len="med"/>
+                      <a:tailEnd type="none" w="med" len="med"/>
+                    </a:lnB>
+                    <a:lnTlToBr w="12700" cmpd="sng">
+                      <a:noFill/>
+                      <a:prstDash val="solid"/>
+                    </a:lnTlToBr>
+                    <a:lnBlToTr w="12700" cmpd="sng">
+                      <a:noFill/>
+                      <a:prstDash val="solid"/>
+                    </a:lnBlToTr>
+                  </a:tcPr>
+                </a:tc>
+                <a:tc>
+                  <a:txBody>
+                    <a:bodyPr/>
+                    <a:lstStyle/>
+                    <a:p>
+                      <a:pPr algn="ctr"/>
+                      <a:r>
+                        <a:rPr lang="en-US" sz="1500" dirty="0">
+                          <a:latin typeface="Arial" panose="020B0604020202020204" pitchFamily="34" charset="0"/>
+                          <a:cs typeface="Arial" panose="020B0604020202020204" pitchFamily="34" charset="0"/>
+                        </a:rPr>
+                        <a:t>2050</a:t>
+                      </a:r>
+                    </a:p>
+                    <a:p>
+                      <a:pPr algn="ctr"/>
+                      <a:r>
+                        <a:rPr lang="en-US" sz="1500" dirty="0">
+                          <a:latin typeface="Arial" panose="020B0604020202020204" pitchFamily="34" charset="0"/>
+                          <a:cs typeface="Arial" panose="020B0604020202020204" pitchFamily="34" charset="0"/>
+                        </a:rPr>
+                        <a:t>-2059</a:t>
+                      </a:r>
+                    </a:p>
+                  </a:txBody>
+                  <a:tcPr>
+                    <a:lnL w="12700" cap="flat" cmpd="sng" algn="ctr">
+                      <a:noFill/>
+                      <a:prstDash val="solid"/>
+                      <a:round/>
+                      <a:headEnd type="none" w="med" len="med"/>
+                      <a:tailEnd type="none" w="med" len="med"/>
+                    </a:lnL>
+                    <a:lnR w="12700" cap="flat" cmpd="sng" algn="ctr">
+                      <a:noFill/>
+                      <a:prstDash val="solid"/>
+                      <a:round/>
+                      <a:headEnd type="none" w="med" len="med"/>
+                      <a:tailEnd type="none" w="med" len="med"/>
+                    </a:lnR>
+                    <a:lnT w="12700" cap="flat" cmpd="sng" algn="ctr">
+                      <a:noFill/>
+                      <a:prstDash val="solid"/>
+                      <a:round/>
+                      <a:headEnd type="none" w="med" len="med"/>
+                      <a:tailEnd type="none" w="med" len="med"/>
+                    </a:lnT>
+                    <a:lnB w="12700" cap="flat" cmpd="sng" algn="ctr">
+                      <a:noFill/>
+                      <a:prstDash val="solid"/>
+                      <a:round/>
+                      <a:headEnd type="none" w="med" len="med"/>
+                      <a:tailEnd type="none" w="med" len="med"/>
+                    </a:lnB>
+                    <a:lnTlToBr w="12700" cmpd="sng">
+                      <a:noFill/>
+                      <a:prstDash val="solid"/>
+                    </a:lnTlToBr>
+                    <a:lnBlToTr w="12700" cmpd="sng">
+                      <a:noFill/>
+                      <a:prstDash val="solid"/>
+                    </a:lnBlToTr>
+                  </a:tcPr>
+                </a:tc>
+                <a:extLst>
+                  <a:ext uri="{0D108BD9-81ED-4DB2-BD59-A6C34878D82A}">
+                    <a16:rowId xmlns:a16="http://schemas.microsoft.com/office/drawing/2014/main" val="2278105072"/>
+                  </a:ext>
+                </a:extLst>
+              </a:tr>
+            </a:tbl>
+          </a:graphicData>
+        </a:graphic>
+      </p:graphicFrame>
+      <p:sp>
+        <p:nvSpPr>
+          <p:cNvPr id="45" name="Oval 44">
+            <a:extLst>
+              <a:ext uri="{FF2B5EF4-FFF2-40B4-BE49-F238E27FC236}">
+                <a16:creationId xmlns:a16="http://schemas.microsoft.com/office/drawing/2014/main" id="{16F7AC7D-9076-46C4-B6DF-2385943FEFE1}"/>
+              </a:ext>
+            </a:extLst>
+          </p:cNvPr>
+          <p:cNvSpPr/>
+          <p:nvPr/>
+        </p:nvSpPr>
+        <p:spPr>
+          <a:xfrm>
+            <a:off x="571034" y="4022767"/>
+            <a:ext cx="274320" cy="274320"/>
+          </a:xfrm>
+          <a:prstGeom prst="ellipse">
+            <a:avLst/>
+          </a:prstGeom>
+          <a:solidFill>
+            <a:schemeClr val="bg1">
+              <a:lumMod val="75000"/>
+            </a:schemeClr>
+          </a:solidFill>
+          <a:ln w="19050">
+            <a:solidFill>
+              <a:schemeClr val="tx1"/>
+            </a:solidFill>
+          </a:ln>
+        </p:spPr>
+        <p:style>
+          <a:lnRef idx="2">
+            <a:schemeClr val="accent1">
+              <a:shade val="50000"/>
+            </a:schemeClr>
+          </a:lnRef>
+          <a:fillRef idx="1">
+            <a:schemeClr val="accent1"/>
+          </a:fillRef>
+          <a:effectRef idx="0">
+            <a:schemeClr val="accent1"/>
+          </a:effectRef>
+          <a:fontRef idx="minor">
+            <a:schemeClr val="lt1"/>
+          </a:fontRef>
+        </p:style>
+        <p:txBody>
+          <a:bodyPr rtlCol="0" anchor="ctr"/>
+          <a:lstStyle/>
+          <a:p>
+            <a:pPr algn="ctr"/>
+            <a:endParaRPr lang="en-US" sz="1500">
+              <a:latin typeface="Times New Roman" panose="02020603050405020304" pitchFamily="18" charset="0"/>
+              <a:cs typeface="Times New Roman" panose="02020603050405020304" pitchFamily="18" charset="0"/>
+            </a:endParaRPr>
+          </a:p>
+        </p:txBody>
+      </p:sp>
+      <p:sp>
+        <p:nvSpPr>
+          <p:cNvPr id="47" name="Oval 46">
+            <a:extLst>
+              <a:ext uri="{FF2B5EF4-FFF2-40B4-BE49-F238E27FC236}">
+                <a16:creationId xmlns:a16="http://schemas.microsoft.com/office/drawing/2014/main" id="{98AED6B0-C048-40CF-8B88-64E122FB7F61}"/>
+              </a:ext>
+            </a:extLst>
+          </p:cNvPr>
+          <p:cNvSpPr/>
+          <p:nvPr/>
+        </p:nvSpPr>
+        <p:spPr>
+          <a:xfrm>
+            <a:off x="571034" y="4402729"/>
+            <a:ext cx="274320" cy="274320"/>
+          </a:xfrm>
+          <a:prstGeom prst="ellipse">
+            <a:avLst/>
+          </a:prstGeom>
+          <a:solidFill>
+            <a:schemeClr val="tx1">
+              <a:lumMod val="95000"/>
+              <a:lumOff val="5000"/>
+            </a:schemeClr>
+          </a:solidFill>
+          <a:ln w="19050">
+            <a:solidFill>
+              <a:schemeClr val="tx1"/>
+            </a:solidFill>
+          </a:ln>
+        </p:spPr>
+        <p:style>
+          <a:lnRef idx="2">
+            <a:schemeClr val="accent1">
+              <a:shade val="50000"/>
+            </a:schemeClr>
+          </a:lnRef>
+          <a:fillRef idx="1">
+            <a:schemeClr val="accent1"/>
+          </a:fillRef>
+          <a:effectRef idx="0">
+            <a:schemeClr val="accent1"/>
+          </a:effectRef>
+          <a:fontRef idx="minor">
+            <a:schemeClr val="lt1"/>
+          </a:fontRef>
+        </p:style>
+        <p:txBody>
+          <a:bodyPr rtlCol="0" anchor="ctr"/>
+          <a:lstStyle/>
+          <a:p>
+            <a:pPr algn="ctr"/>
+            <a:endParaRPr lang="en-US" sz="1500">
+              <a:latin typeface="Times New Roman" panose="02020603050405020304" pitchFamily="18" charset="0"/>
+              <a:cs typeface="Times New Roman" panose="02020603050405020304" pitchFamily="18" charset="0"/>
+            </a:endParaRPr>
+          </a:p>
+        </p:txBody>
+      </p:sp>
+      <p:sp>
+        <p:nvSpPr>
+          <p:cNvPr id="48" name="Oval 47">
+            <a:extLst>
+              <a:ext uri="{FF2B5EF4-FFF2-40B4-BE49-F238E27FC236}">
+                <a16:creationId xmlns:a16="http://schemas.microsoft.com/office/drawing/2014/main" id="{112BD022-F499-4E4B-9E8A-19A9F17EC2D9}"/>
+              </a:ext>
+            </a:extLst>
+          </p:cNvPr>
+          <p:cNvSpPr/>
+          <p:nvPr/>
+        </p:nvSpPr>
+        <p:spPr>
+          <a:xfrm>
+            <a:off x="571034" y="3656573"/>
+            <a:ext cx="274320" cy="274320"/>
+          </a:xfrm>
+          <a:prstGeom prst="ellipse">
+            <a:avLst/>
+          </a:prstGeom>
+          <a:noFill/>
+          <a:ln w="19050">
+            <a:solidFill>
+              <a:schemeClr val="tx1"/>
+            </a:solidFill>
+          </a:ln>
+        </p:spPr>
+        <p:style>
+          <a:lnRef idx="2">
+            <a:schemeClr val="accent1">
+              <a:shade val="50000"/>
+            </a:schemeClr>
+          </a:lnRef>
+          <a:fillRef idx="1">
+            <a:schemeClr val="accent1"/>
+          </a:fillRef>
+          <a:effectRef idx="0">
+            <a:schemeClr val="accent1"/>
+          </a:effectRef>
+          <a:fontRef idx="minor">
+            <a:schemeClr val="lt1"/>
+          </a:fontRef>
+        </p:style>
+        <p:txBody>
+          <a:bodyPr rtlCol="0" anchor="ctr"/>
+          <a:lstStyle/>
+          <a:p>
+            <a:pPr algn="ctr"/>
+            <a:endParaRPr lang="en-US" sz="1500">
+              <a:latin typeface="Times New Roman" panose="02020603050405020304" pitchFamily="18" charset="0"/>
+              <a:cs typeface="Times New Roman" panose="02020603050405020304" pitchFamily="18" charset="0"/>
+            </a:endParaRPr>
+          </a:p>
+        </p:txBody>
+      </p:sp>
+      <p:sp>
+        <p:nvSpPr>
+          <p:cNvPr id="49" name="TextBox 48">
+            <a:extLst>
+              <a:ext uri="{FF2B5EF4-FFF2-40B4-BE49-F238E27FC236}">
+                <a16:creationId xmlns:a16="http://schemas.microsoft.com/office/drawing/2014/main" id="{635C011B-D2B7-4445-B1AA-0235FD52B9A5}"/>
+              </a:ext>
+            </a:extLst>
+          </p:cNvPr>
+          <p:cNvSpPr txBox="1"/>
+          <p:nvPr/>
+        </p:nvSpPr>
+        <p:spPr>
+          <a:xfrm>
+            <a:off x="819599" y="3557564"/>
+            <a:ext cx="2098651" cy="1156086"/>
+          </a:xfrm>
+          <a:prstGeom prst="rect">
+            <a:avLst/>
+          </a:prstGeom>
+          <a:noFill/>
+        </p:spPr>
+        <p:txBody>
+          <a:bodyPr wrap="none" rtlCol="0">
+            <a:spAutoFit/>
+          </a:bodyPr>
+          <a:lstStyle/>
+          <a:p>
+            <a:pPr>
+              <a:lnSpc>
+                <a:spcPct val="150000"/>
+              </a:lnSpc>
+            </a:pPr>
+            <a:r>
+              <a:rPr lang="en-US" sz="1600" dirty="0">
+                <a:latin typeface="Times New Roman" panose="02020603050405020304" pitchFamily="18" charset="0"/>
+                <a:cs typeface="Times New Roman" panose="02020603050405020304" pitchFamily="18" charset="0"/>
+              </a:rPr>
+              <a:t>Current capital costs</a:t>
+            </a:r>
+          </a:p>
+          <a:p>
+            <a:pPr>
+              <a:lnSpc>
+                <a:spcPct val="150000"/>
+              </a:lnSpc>
+            </a:pPr>
+            <a:r>
+              <a:rPr lang="en-US" sz="1600" dirty="0">
+                <a:latin typeface="Times New Roman" panose="02020603050405020304" pitchFamily="18" charset="0"/>
+                <a:cs typeface="Times New Roman" panose="02020603050405020304" pitchFamily="18" charset="0"/>
+              </a:rPr>
+              <a:t>Conservative reduction</a:t>
+            </a:r>
+          </a:p>
+          <a:p>
+            <a:pPr>
+              <a:lnSpc>
+                <a:spcPct val="150000"/>
+              </a:lnSpc>
+            </a:pPr>
+            <a:r>
+              <a:rPr lang="en-US" sz="1600" dirty="0">
+                <a:latin typeface="Times New Roman" panose="02020603050405020304" pitchFamily="18" charset="0"/>
+                <a:cs typeface="Times New Roman" panose="02020603050405020304" pitchFamily="18" charset="0"/>
+              </a:rPr>
+              <a:t>Optimistic reduction</a:t>
+            </a:r>
+          </a:p>
+        </p:txBody>
+      </p:sp>
+      <p:sp>
+        <p:nvSpPr>
+          <p:cNvPr id="117" name="TextBox 116">
+            <a:extLst>
+              <a:ext uri="{FF2B5EF4-FFF2-40B4-BE49-F238E27FC236}">
+                <a16:creationId xmlns:a16="http://schemas.microsoft.com/office/drawing/2014/main" id="{2CF2E7CF-A858-437B-9A8F-C76D22D57027}"/>
+              </a:ext>
+            </a:extLst>
+          </p:cNvPr>
+          <p:cNvSpPr txBox="1"/>
+          <p:nvPr/>
+        </p:nvSpPr>
+        <p:spPr>
+          <a:xfrm>
+            <a:off x="3292197" y="4415316"/>
+            <a:ext cx="476412" cy="369332"/>
+          </a:xfrm>
+          <a:prstGeom prst="rect">
+            <a:avLst/>
+          </a:prstGeom>
+          <a:noFill/>
+        </p:spPr>
+        <p:txBody>
+          <a:bodyPr wrap="none" rtlCol="0">
+            <a:spAutoFit/>
+          </a:bodyPr>
+          <a:lstStyle/>
+          <a:p>
+            <a:r>
+              <a:rPr lang="en-US" dirty="0"/>
+              <a:t>0.5</a:t>
+            </a:r>
+          </a:p>
+        </p:txBody>
+      </p:sp>
+      <p:sp>
+        <p:nvSpPr>
+          <p:cNvPr id="123" name="Oval 122">
+            <a:extLst>
+              <a:ext uri="{FF2B5EF4-FFF2-40B4-BE49-F238E27FC236}">
+                <a16:creationId xmlns:a16="http://schemas.microsoft.com/office/drawing/2014/main" id="{354884C3-0CD1-4483-82D2-5234D6C15CB1}"/>
+              </a:ext>
+            </a:extLst>
+          </p:cNvPr>
+          <p:cNvSpPr/>
+          <p:nvPr/>
+        </p:nvSpPr>
+        <p:spPr>
+          <a:xfrm>
+            <a:off x="3216776" y="3927409"/>
+            <a:ext cx="274320" cy="274320"/>
+          </a:xfrm>
+          <a:prstGeom prst="ellipse">
+            <a:avLst/>
+          </a:prstGeom>
+          <a:noFill/>
+          <a:ln w="19050">
+            <a:solidFill>
+              <a:schemeClr val="tx1"/>
+            </a:solidFill>
+          </a:ln>
+        </p:spPr>
+        <p:style>
+          <a:lnRef idx="2">
+            <a:schemeClr val="accent1">
+              <a:shade val="50000"/>
+            </a:schemeClr>
+          </a:lnRef>
+          <a:fillRef idx="1">
+            <a:schemeClr val="accent1"/>
+          </a:fillRef>
+          <a:effectRef idx="0">
+            <a:schemeClr val="accent1"/>
+          </a:effectRef>
+          <a:fontRef idx="minor">
+            <a:schemeClr val="lt1"/>
+          </a:fontRef>
+        </p:style>
+        <p:txBody>
+          <a:bodyPr rtlCol="0" anchor="ctr"/>
+          <a:lstStyle/>
+          <a:p>
+            <a:pPr algn="ctr"/>
+            <a:endParaRPr lang="en-US" sz="1500">
+              <a:latin typeface="Times New Roman" panose="02020603050405020304" pitchFamily="18" charset="0"/>
+              <a:cs typeface="Times New Roman" panose="02020603050405020304" pitchFamily="18" charset="0"/>
+            </a:endParaRPr>
+          </a:p>
+        </p:txBody>
+      </p:sp>
+      <p:cxnSp>
+        <p:nvCxnSpPr>
+          <p:cNvPr id="51" name="Straight Connector 50">
+            <a:extLst>
+              <a:ext uri="{FF2B5EF4-FFF2-40B4-BE49-F238E27FC236}">
+                <a16:creationId xmlns:a16="http://schemas.microsoft.com/office/drawing/2014/main" id="{0FC6DE10-61C2-45D4-BCC3-08CD9FC92492}"/>
+              </a:ext>
+            </a:extLst>
+          </p:cNvPr>
+          <p:cNvCxnSpPr>
+            <a:cxnSpLocks/>
+          </p:cNvCxnSpPr>
+          <p:nvPr/>
+        </p:nvCxnSpPr>
+        <p:spPr>
+          <a:xfrm flipH="1">
+            <a:off x="3476663" y="2926806"/>
+            <a:ext cx="631484" cy="1097280"/>
+          </a:xfrm>
+          <a:prstGeom prst="line">
+            <a:avLst/>
+          </a:prstGeom>
+          <a:ln w="38100">
+            <a:solidFill>
+              <a:schemeClr val="tx1"/>
+            </a:solidFill>
+            <a:headEnd type="triangle" w="med" len="med"/>
+            <a:tailEnd type="none" w="med" len="med"/>
+          </a:ln>
+        </p:spPr>
+        <p:style>
+          <a:lnRef idx="1">
+            <a:schemeClr val="accent1"/>
+          </a:lnRef>
+          <a:fillRef idx="0">
+            <a:schemeClr val="accent1"/>
+          </a:fillRef>
+          <a:effectRef idx="0">
+            <a:schemeClr val="accent1"/>
+          </a:effectRef>
+          <a:fontRef idx="minor">
+            <a:schemeClr val="tx1"/>
+          </a:fontRef>
+        </p:style>
+      </p:cxnSp>
+      <p:cxnSp>
+        <p:nvCxnSpPr>
+          <p:cNvPr id="53" name="Straight Connector 52">
+            <a:extLst>
+              <a:ext uri="{FF2B5EF4-FFF2-40B4-BE49-F238E27FC236}">
+                <a16:creationId xmlns:a16="http://schemas.microsoft.com/office/drawing/2014/main" id="{44878591-9265-4FEA-88B7-4FD8A047BB78}"/>
+              </a:ext>
+            </a:extLst>
+          </p:cNvPr>
+          <p:cNvCxnSpPr>
+            <a:cxnSpLocks/>
+          </p:cNvCxnSpPr>
+          <p:nvPr/>
+        </p:nvCxnSpPr>
+        <p:spPr>
+          <a:xfrm flipH="1" flipV="1">
+            <a:off x="3485715" y="4058404"/>
+            <a:ext cx="630936" cy="1097280"/>
+          </a:xfrm>
+          <a:prstGeom prst="line">
+            <a:avLst/>
+          </a:prstGeom>
+          <a:ln w="38100">
+            <a:solidFill>
+              <a:schemeClr val="tx1"/>
+            </a:solidFill>
+            <a:headEnd type="triangle" w="med" len="med"/>
+            <a:tailEnd type="none" w="med" len="med"/>
+          </a:ln>
+        </p:spPr>
+        <p:style>
+          <a:lnRef idx="1">
+            <a:schemeClr val="accent1"/>
+          </a:lnRef>
+          <a:fillRef idx="0">
+            <a:schemeClr val="accent1"/>
+          </a:fillRef>
+          <a:effectRef idx="0">
+            <a:schemeClr val="accent1"/>
+          </a:effectRef>
+          <a:fontRef idx="minor">
+            <a:schemeClr val="tx1"/>
+          </a:fontRef>
+        </p:style>
+      </p:cxnSp>
+      <p:sp>
+        <p:nvSpPr>
+          <p:cNvPr id="170" name="Oval 169">
+            <a:extLst>
+              <a:ext uri="{FF2B5EF4-FFF2-40B4-BE49-F238E27FC236}">
+                <a16:creationId xmlns:a16="http://schemas.microsoft.com/office/drawing/2014/main" id="{22BA4621-168E-4AE8-B1D0-D0AB58D9485C}"/>
+              </a:ext>
+            </a:extLst>
+          </p:cNvPr>
+          <p:cNvSpPr/>
+          <p:nvPr/>
+        </p:nvSpPr>
+        <p:spPr>
+          <a:xfrm>
+            <a:off x="5014199" y="2245017"/>
+            <a:ext cx="274320" cy="274320"/>
+          </a:xfrm>
+          <a:prstGeom prst="ellipse">
+            <a:avLst/>
+          </a:prstGeom>
+          <a:solidFill>
+            <a:schemeClr val="bg1">
+              <a:lumMod val="75000"/>
+            </a:schemeClr>
+          </a:solidFill>
+          <a:ln w="19050">
+            <a:solidFill>
+              <a:schemeClr val="tx1"/>
+            </a:solidFill>
+          </a:ln>
+        </p:spPr>
+        <p:style>
+          <a:lnRef idx="2">
+            <a:schemeClr val="accent1">
+              <a:shade val="50000"/>
+            </a:schemeClr>
+          </a:lnRef>
+          <a:fillRef idx="1">
+            <a:schemeClr val="accent1"/>
+          </a:fillRef>
+          <a:effectRef idx="0">
+            <a:schemeClr val="accent1"/>
+          </a:effectRef>
+          <a:fontRef idx="minor">
+            <a:schemeClr val="lt1"/>
+          </a:fontRef>
+        </p:style>
+        <p:txBody>
+          <a:bodyPr rtlCol="0" anchor="ctr"/>
+          <a:lstStyle/>
+          <a:p>
+            <a:pPr algn="ctr"/>
+            <a:endParaRPr lang="en-US" sz="1500">
+              <a:latin typeface="Times New Roman" panose="02020603050405020304" pitchFamily="18" charset="0"/>
+              <a:cs typeface="Times New Roman" panose="02020603050405020304" pitchFamily="18" charset="0"/>
+            </a:endParaRPr>
+          </a:p>
+        </p:txBody>
+      </p:sp>
+      <p:sp>
+        <p:nvSpPr>
+          <p:cNvPr id="171" name="Oval 170">
+            <a:extLst>
+              <a:ext uri="{FF2B5EF4-FFF2-40B4-BE49-F238E27FC236}">
+                <a16:creationId xmlns:a16="http://schemas.microsoft.com/office/drawing/2014/main" id="{3BF15C42-CFBA-46F2-8AB3-FE950D1ADA0F}"/>
+              </a:ext>
+            </a:extLst>
+          </p:cNvPr>
+          <p:cNvSpPr/>
+          <p:nvPr/>
+        </p:nvSpPr>
+        <p:spPr>
+          <a:xfrm>
+            <a:off x="5014199" y="3335730"/>
+            <a:ext cx="274320" cy="283727"/>
+          </a:xfrm>
+          <a:prstGeom prst="ellipse">
+            <a:avLst/>
+          </a:prstGeom>
+          <a:solidFill>
+            <a:schemeClr val="tx1"/>
+          </a:solidFill>
+          <a:ln w="19050">
+            <a:solidFill>
+              <a:schemeClr val="tx1"/>
+            </a:solidFill>
+          </a:ln>
+        </p:spPr>
+        <p:style>
+          <a:lnRef idx="2">
+            <a:schemeClr val="accent1">
+              <a:shade val="50000"/>
+            </a:schemeClr>
+          </a:lnRef>
+          <a:fillRef idx="1">
+            <a:schemeClr val="accent1"/>
+          </a:fillRef>
+          <a:effectRef idx="0">
+            <a:schemeClr val="accent1"/>
+          </a:effectRef>
+          <a:fontRef idx="minor">
+            <a:schemeClr val="lt1"/>
+          </a:fontRef>
+        </p:style>
+        <p:txBody>
+          <a:bodyPr rtlCol="0" anchor="ctr"/>
+          <a:lstStyle/>
+          <a:p>
+            <a:pPr algn="ctr"/>
+            <a:endParaRPr lang="en-US" sz="1500">
+              <a:latin typeface="Times New Roman" panose="02020603050405020304" pitchFamily="18" charset="0"/>
+              <a:cs typeface="Times New Roman" panose="02020603050405020304" pitchFamily="18" charset="0"/>
+            </a:endParaRPr>
+          </a:p>
+        </p:txBody>
+      </p:sp>
+      <p:cxnSp>
+        <p:nvCxnSpPr>
+          <p:cNvPr id="172" name="Straight Connector 171">
+            <a:extLst>
+              <a:ext uri="{FF2B5EF4-FFF2-40B4-BE49-F238E27FC236}">
+                <a16:creationId xmlns:a16="http://schemas.microsoft.com/office/drawing/2014/main" id="{9A5E88E3-1403-47B1-BFED-65C86CC7BB79}"/>
+              </a:ext>
+            </a:extLst>
+          </p:cNvPr>
+          <p:cNvCxnSpPr>
+            <a:cxnSpLocks/>
+          </p:cNvCxnSpPr>
+          <p:nvPr/>
+        </p:nvCxnSpPr>
+        <p:spPr>
+          <a:xfrm flipH="1">
+            <a:off x="4385590" y="2382177"/>
+            <a:ext cx="628609" cy="548640"/>
+          </a:xfrm>
+          <a:prstGeom prst="line">
+            <a:avLst/>
+          </a:prstGeom>
+          <a:ln w="38100">
+            <a:solidFill>
+              <a:schemeClr val="tx1"/>
+            </a:solidFill>
+            <a:headEnd type="triangle" w="med" len="med"/>
+            <a:tailEnd type="none" w="med" len="med"/>
+          </a:ln>
+        </p:spPr>
+        <p:style>
+          <a:lnRef idx="1">
+            <a:schemeClr val="accent1"/>
+          </a:lnRef>
+          <a:fillRef idx="0">
+            <a:schemeClr val="accent1"/>
+          </a:fillRef>
+          <a:effectRef idx="0">
+            <a:schemeClr val="accent1"/>
+          </a:effectRef>
+          <a:fontRef idx="minor">
+            <a:schemeClr val="tx1"/>
+          </a:fontRef>
+        </p:style>
+      </p:cxnSp>
+      <p:cxnSp>
+        <p:nvCxnSpPr>
+          <p:cNvPr id="173" name="Straight Connector 172">
+            <a:extLst>
+              <a:ext uri="{FF2B5EF4-FFF2-40B4-BE49-F238E27FC236}">
+                <a16:creationId xmlns:a16="http://schemas.microsoft.com/office/drawing/2014/main" id="{73A738FC-2041-4CF0-BE5B-FB1E542B233D}"/>
+              </a:ext>
+            </a:extLst>
+          </p:cNvPr>
+          <p:cNvCxnSpPr>
+            <a:cxnSpLocks/>
+          </p:cNvCxnSpPr>
+          <p:nvPr/>
+        </p:nvCxnSpPr>
+        <p:spPr>
+          <a:xfrm flipH="1" flipV="1">
+            <a:off x="4382466" y="2929238"/>
+            <a:ext cx="628609" cy="548640"/>
+          </a:xfrm>
+          <a:prstGeom prst="line">
+            <a:avLst/>
+          </a:prstGeom>
+          <a:ln w="38100">
+            <a:solidFill>
+              <a:schemeClr val="tx1"/>
+            </a:solidFill>
+            <a:headEnd type="triangle" w="med" len="med"/>
+            <a:tailEnd type="none" w="med" len="med"/>
+          </a:ln>
+        </p:spPr>
+        <p:style>
+          <a:lnRef idx="1">
+            <a:schemeClr val="accent1"/>
+          </a:lnRef>
+          <a:fillRef idx="0">
+            <a:schemeClr val="accent1"/>
+          </a:fillRef>
+          <a:effectRef idx="0">
+            <a:schemeClr val="accent1"/>
+          </a:effectRef>
+          <a:fontRef idx="minor">
+            <a:schemeClr val="tx1"/>
+          </a:fontRef>
+        </p:style>
+      </p:cxnSp>
+      <p:grpSp>
+        <p:nvGrpSpPr>
+          <p:cNvPr id="2" name="Group 1">
+            <a:extLst>
+              <a:ext uri="{FF2B5EF4-FFF2-40B4-BE49-F238E27FC236}">
+                <a16:creationId xmlns:a16="http://schemas.microsoft.com/office/drawing/2014/main" id="{43D9CDFC-F805-4481-9405-0FD346B057A5}"/>
+              </a:ext>
+            </a:extLst>
+          </p:cNvPr>
+          <p:cNvGrpSpPr/>
+          <p:nvPr/>
+        </p:nvGrpSpPr>
+        <p:grpSpPr>
+          <a:xfrm>
+            <a:off x="5276891" y="1859343"/>
+            <a:ext cx="909176" cy="1025754"/>
+            <a:chOff x="2916930" y="1931720"/>
+            <a:chExt cx="909176" cy="1025754"/>
+          </a:xfrm>
+        </p:grpSpPr>
+        <p:sp>
+          <p:nvSpPr>
+            <p:cNvPr id="178" name="Oval 177">
+              <a:extLst>
+                <a:ext uri="{FF2B5EF4-FFF2-40B4-BE49-F238E27FC236}">
+                  <a16:creationId xmlns:a16="http://schemas.microsoft.com/office/drawing/2014/main" id="{069719CA-28F8-46E4-A409-79C284F03F54}"/>
+                </a:ext>
+              </a:extLst>
+            </p:cNvPr>
+            <p:cNvSpPr/>
+            <p:nvPr/>
+          </p:nvSpPr>
+          <p:spPr>
+            <a:xfrm>
+              <a:off x="3551786" y="1931720"/>
+              <a:ext cx="274320" cy="274320"/>
+            </a:xfrm>
+            <a:prstGeom prst="ellipse">
+              <a:avLst/>
+            </a:prstGeom>
+            <a:solidFill>
+              <a:schemeClr val="bg1">
+                <a:lumMod val="75000"/>
+              </a:schemeClr>
+            </a:solidFill>
+            <a:ln w="19050">
+              <a:solidFill>
+                <a:schemeClr val="tx1"/>
+              </a:solidFill>
+            </a:ln>
+          </p:spPr>
+          <p:style>
+            <a:lnRef idx="2">
+              <a:schemeClr val="accent1">
+                <a:shade val="50000"/>
+              </a:schemeClr>
+            </a:lnRef>
+            <a:fillRef idx="1">
+              <a:schemeClr val="accent1"/>
+            </a:fillRef>
+            <a:effectRef idx="0">
+              <a:schemeClr val="accent1"/>
+            </a:effectRef>
+            <a:fontRef idx="minor">
+              <a:schemeClr val="lt1"/>
+            </a:fontRef>
+          </p:style>
+          <p:txBody>
+            <a:bodyPr rtlCol="0" anchor="ctr"/>
+            <a:lstStyle/>
+            <a:p>
+              <a:pPr algn="ctr"/>
+              <a:endParaRPr lang="en-US" sz="1500">
+                <a:latin typeface="Times New Roman" panose="02020603050405020304" pitchFamily="18" charset="0"/>
+                <a:cs typeface="Times New Roman" panose="02020603050405020304" pitchFamily="18" charset="0"/>
+              </a:endParaRPr>
+            </a:p>
+          </p:txBody>
+        </p:sp>
+        <p:sp>
+          <p:nvSpPr>
+            <p:cNvPr id="179" name="Oval 178">
+              <a:extLst>
+                <a:ext uri="{FF2B5EF4-FFF2-40B4-BE49-F238E27FC236}">
+                  <a16:creationId xmlns:a16="http://schemas.microsoft.com/office/drawing/2014/main" id="{68B0B656-4A81-4F83-ACDC-F640CFA2A1D2}"/>
+                </a:ext>
+              </a:extLst>
+            </p:cNvPr>
+            <p:cNvSpPr/>
+            <p:nvPr/>
+          </p:nvSpPr>
+          <p:spPr>
+            <a:xfrm>
+              <a:off x="3545539" y="2683154"/>
+              <a:ext cx="274320" cy="274320"/>
+            </a:xfrm>
+            <a:prstGeom prst="ellipse">
+              <a:avLst/>
+            </a:prstGeom>
+            <a:solidFill>
+              <a:schemeClr val="tx1"/>
+            </a:solidFill>
+            <a:ln w="19050">
+              <a:solidFill>
+                <a:schemeClr val="tx1"/>
+              </a:solidFill>
+            </a:ln>
+          </p:spPr>
+          <p:style>
+            <a:lnRef idx="2">
+              <a:schemeClr val="accent1">
+                <a:shade val="50000"/>
+              </a:schemeClr>
+            </a:lnRef>
+            <a:fillRef idx="1">
+              <a:schemeClr val="accent1"/>
+            </a:fillRef>
+            <a:effectRef idx="0">
+              <a:schemeClr val="accent1"/>
+            </a:effectRef>
+            <a:fontRef idx="minor">
+              <a:schemeClr val="lt1"/>
+            </a:fontRef>
+          </p:style>
+          <p:txBody>
+            <a:bodyPr rtlCol="0" anchor="ctr"/>
+            <a:lstStyle/>
+            <a:p>
+              <a:pPr algn="ctr"/>
+              <a:endParaRPr lang="en-US" sz="1500">
+                <a:latin typeface="Times New Roman" panose="02020603050405020304" pitchFamily="18" charset="0"/>
+                <a:cs typeface="Times New Roman" panose="02020603050405020304" pitchFamily="18" charset="0"/>
+              </a:endParaRPr>
+            </a:p>
+          </p:txBody>
+        </p:sp>
+        <p:cxnSp>
+          <p:nvCxnSpPr>
+            <p:cNvPr id="180" name="Straight Connector 179">
+              <a:extLst>
+                <a:ext uri="{FF2B5EF4-FFF2-40B4-BE49-F238E27FC236}">
+                  <a16:creationId xmlns:a16="http://schemas.microsoft.com/office/drawing/2014/main" id="{1FA9EDE5-21C1-4CF9-AF17-247D1D264F36}"/>
+                </a:ext>
+              </a:extLst>
+            </p:cNvPr>
+            <p:cNvCxnSpPr>
+              <a:cxnSpLocks/>
+            </p:cNvCxnSpPr>
+            <p:nvPr/>
+          </p:nvCxnSpPr>
+          <p:spPr>
+            <a:xfrm flipH="1">
+              <a:off x="2916930" y="2068880"/>
+              <a:ext cx="628609" cy="365760"/>
+            </a:xfrm>
+            <a:prstGeom prst="line">
+              <a:avLst/>
+            </a:prstGeom>
+            <a:ln w="38100">
+              <a:solidFill>
+                <a:schemeClr val="tx1"/>
+              </a:solidFill>
+              <a:headEnd type="triangle" w="med" len="med"/>
+              <a:tailEnd type="none" w="med" len="med"/>
+            </a:ln>
+          </p:spPr>
+          <p:style>
+            <a:lnRef idx="1">
+              <a:schemeClr val="accent1"/>
+            </a:lnRef>
+            <a:fillRef idx="0">
+              <a:schemeClr val="accent1"/>
+            </a:fillRef>
+            <a:effectRef idx="0">
+              <a:schemeClr val="accent1"/>
+            </a:effectRef>
+            <a:fontRef idx="minor">
+              <a:schemeClr val="tx1"/>
+            </a:fontRef>
+          </p:style>
+        </p:cxnSp>
+        <p:cxnSp>
+          <p:nvCxnSpPr>
+            <p:cNvPr id="181" name="Straight Connector 180">
+              <a:extLst>
+                <a:ext uri="{FF2B5EF4-FFF2-40B4-BE49-F238E27FC236}">
+                  <a16:creationId xmlns:a16="http://schemas.microsoft.com/office/drawing/2014/main" id="{3244D99E-7160-47CC-A0D6-E7A3D7BCD30A}"/>
+                </a:ext>
+              </a:extLst>
+            </p:cNvPr>
+            <p:cNvCxnSpPr>
+              <a:cxnSpLocks/>
+            </p:cNvCxnSpPr>
+            <p:nvPr/>
+          </p:nvCxnSpPr>
+          <p:spPr>
+            <a:xfrm flipH="1" flipV="1">
+              <a:off x="2928558" y="2454554"/>
+              <a:ext cx="628609" cy="365760"/>
+            </a:xfrm>
+            <a:prstGeom prst="line">
+              <a:avLst/>
+            </a:prstGeom>
+            <a:ln w="38100">
+              <a:solidFill>
+                <a:schemeClr val="tx1"/>
+              </a:solidFill>
+              <a:headEnd type="triangle" w="med" len="med"/>
+              <a:tailEnd type="none" w="med" len="med"/>
+            </a:ln>
+          </p:spPr>
+          <p:style>
+            <a:lnRef idx="1">
+              <a:schemeClr val="accent1"/>
+            </a:lnRef>
+            <a:fillRef idx="0">
+              <a:schemeClr val="accent1"/>
+            </a:fillRef>
+            <a:effectRef idx="0">
+              <a:schemeClr val="accent1"/>
+            </a:effectRef>
+            <a:fontRef idx="minor">
+              <a:schemeClr val="tx1"/>
+            </a:fontRef>
+          </p:style>
+        </p:cxnSp>
+      </p:grpSp>
+      <p:sp>
+        <p:nvSpPr>
+          <p:cNvPr id="209" name="TextBox 208">
+            <a:extLst>
+              <a:ext uri="{FF2B5EF4-FFF2-40B4-BE49-F238E27FC236}">
+                <a16:creationId xmlns:a16="http://schemas.microsoft.com/office/drawing/2014/main" id="{4C2520DE-02C1-41DE-85D9-98D057046E5F}"/>
+              </a:ext>
+            </a:extLst>
+          </p:cNvPr>
+          <p:cNvSpPr txBox="1"/>
+          <p:nvPr/>
+        </p:nvSpPr>
+        <p:spPr>
+          <a:xfrm>
+            <a:off x="3324771" y="3242442"/>
+            <a:ext cx="476412" cy="369332"/>
+          </a:xfrm>
+          <a:prstGeom prst="rect">
+            <a:avLst/>
+          </a:prstGeom>
+          <a:noFill/>
+        </p:spPr>
+        <p:txBody>
+          <a:bodyPr wrap="none" rtlCol="0">
+            <a:spAutoFit/>
+          </a:bodyPr>
+          <a:lstStyle/>
+          <a:p>
+            <a:r>
+              <a:rPr lang="en-US" dirty="0"/>
+              <a:t>0.5</a:t>
+            </a:r>
+          </a:p>
+        </p:txBody>
+      </p:sp>
+      <p:grpSp>
+        <p:nvGrpSpPr>
+          <p:cNvPr id="107" name="Group 106">
+            <a:extLst>
+              <a:ext uri="{FF2B5EF4-FFF2-40B4-BE49-F238E27FC236}">
+                <a16:creationId xmlns:a16="http://schemas.microsoft.com/office/drawing/2014/main" id="{39ECE0C8-A59B-4239-BA17-A3008629E2C2}"/>
+              </a:ext>
+            </a:extLst>
+          </p:cNvPr>
+          <p:cNvGrpSpPr/>
+          <p:nvPr/>
+        </p:nvGrpSpPr>
+        <p:grpSpPr>
+          <a:xfrm>
+            <a:off x="5276891" y="2983175"/>
+            <a:ext cx="909176" cy="1025754"/>
+            <a:chOff x="2916930" y="1931720"/>
+            <a:chExt cx="909176" cy="1025754"/>
+          </a:xfrm>
+        </p:grpSpPr>
+        <p:sp>
+          <p:nvSpPr>
+            <p:cNvPr id="108" name="Oval 107">
+              <a:extLst>
+                <a:ext uri="{FF2B5EF4-FFF2-40B4-BE49-F238E27FC236}">
+                  <a16:creationId xmlns:a16="http://schemas.microsoft.com/office/drawing/2014/main" id="{4BF61E4B-91A5-4BF5-9526-02BE37A8FA1C}"/>
+                </a:ext>
+              </a:extLst>
+            </p:cNvPr>
+            <p:cNvSpPr/>
+            <p:nvPr/>
+          </p:nvSpPr>
+          <p:spPr>
+            <a:xfrm>
+              <a:off x="3551786" y="1931720"/>
+              <a:ext cx="274320" cy="274320"/>
+            </a:xfrm>
+            <a:prstGeom prst="ellipse">
+              <a:avLst/>
+            </a:prstGeom>
+            <a:solidFill>
+              <a:schemeClr val="bg1">
+                <a:lumMod val="75000"/>
+              </a:schemeClr>
+            </a:solidFill>
+            <a:ln w="19050">
+              <a:solidFill>
+                <a:schemeClr val="tx1"/>
+              </a:solidFill>
+            </a:ln>
+          </p:spPr>
+          <p:style>
+            <a:lnRef idx="2">
+              <a:schemeClr val="accent1">
+                <a:shade val="50000"/>
+              </a:schemeClr>
+            </a:lnRef>
+            <a:fillRef idx="1">
+              <a:schemeClr val="accent1"/>
+            </a:fillRef>
+            <a:effectRef idx="0">
+              <a:schemeClr val="accent1"/>
+            </a:effectRef>
+            <a:fontRef idx="minor">
+              <a:schemeClr val="lt1"/>
+            </a:fontRef>
+          </p:style>
+          <p:txBody>
+            <a:bodyPr rtlCol="0" anchor="ctr"/>
+            <a:lstStyle/>
+            <a:p>
+              <a:pPr algn="ctr"/>
+              <a:endParaRPr lang="en-US" sz="1500">
+                <a:latin typeface="Times New Roman" panose="02020603050405020304" pitchFamily="18" charset="0"/>
+                <a:cs typeface="Times New Roman" panose="02020603050405020304" pitchFamily="18" charset="0"/>
+              </a:endParaRPr>
+            </a:p>
+          </p:txBody>
+        </p:sp>
+        <p:sp>
+          <p:nvSpPr>
+            <p:cNvPr id="109" name="Oval 108">
+              <a:extLst>
+                <a:ext uri="{FF2B5EF4-FFF2-40B4-BE49-F238E27FC236}">
+                  <a16:creationId xmlns:a16="http://schemas.microsoft.com/office/drawing/2014/main" id="{7E685402-1C8D-440F-AB4F-57C5A7340EA1}"/>
+                </a:ext>
+              </a:extLst>
+            </p:cNvPr>
+            <p:cNvSpPr/>
+            <p:nvPr/>
+          </p:nvSpPr>
+          <p:spPr>
+            <a:xfrm>
+              <a:off x="3545539" y="2683154"/>
+              <a:ext cx="274320" cy="274320"/>
+            </a:xfrm>
+            <a:prstGeom prst="ellipse">
+              <a:avLst/>
+            </a:prstGeom>
+            <a:solidFill>
+              <a:schemeClr val="tx1"/>
+            </a:solidFill>
+            <a:ln w="19050">
+              <a:solidFill>
+                <a:schemeClr val="tx1"/>
+              </a:solidFill>
+            </a:ln>
+          </p:spPr>
+          <p:style>
+            <a:lnRef idx="2">
+              <a:schemeClr val="accent1">
+                <a:shade val="50000"/>
+              </a:schemeClr>
+            </a:lnRef>
+            <a:fillRef idx="1">
+              <a:schemeClr val="accent1"/>
+            </a:fillRef>
+            <a:effectRef idx="0">
+              <a:schemeClr val="accent1"/>
+            </a:effectRef>
+            <a:fontRef idx="minor">
+              <a:schemeClr val="lt1"/>
+            </a:fontRef>
+          </p:style>
+          <p:txBody>
+            <a:bodyPr rtlCol="0" anchor="ctr"/>
+            <a:lstStyle/>
+            <a:p>
+              <a:pPr algn="ctr"/>
+              <a:endParaRPr lang="en-US" sz="1500">
+                <a:latin typeface="Times New Roman" panose="02020603050405020304" pitchFamily="18" charset="0"/>
+                <a:cs typeface="Times New Roman" panose="02020603050405020304" pitchFamily="18" charset="0"/>
+              </a:endParaRPr>
+            </a:p>
+          </p:txBody>
+        </p:sp>
+        <p:cxnSp>
+          <p:nvCxnSpPr>
+            <p:cNvPr id="110" name="Straight Connector 109">
+              <a:extLst>
+                <a:ext uri="{FF2B5EF4-FFF2-40B4-BE49-F238E27FC236}">
+                  <a16:creationId xmlns:a16="http://schemas.microsoft.com/office/drawing/2014/main" id="{25FBC47C-274C-4B35-9E8B-27FDC2316B2F}"/>
+                </a:ext>
+              </a:extLst>
+            </p:cNvPr>
+            <p:cNvCxnSpPr>
+              <a:cxnSpLocks/>
+            </p:cNvCxnSpPr>
+            <p:nvPr/>
+          </p:nvCxnSpPr>
+          <p:spPr>
+            <a:xfrm flipH="1">
+              <a:off x="2916930" y="2068880"/>
+              <a:ext cx="628609" cy="365760"/>
+            </a:xfrm>
+            <a:prstGeom prst="line">
+              <a:avLst/>
+            </a:prstGeom>
+            <a:ln w="38100">
+              <a:solidFill>
+                <a:schemeClr val="tx1"/>
+              </a:solidFill>
+              <a:headEnd type="triangle" w="med" len="med"/>
+              <a:tailEnd type="none" w="med" len="med"/>
+            </a:ln>
+          </p:spPr>
+          <p:style>
+            <a:lnRef idx="1">
+              <a:schemeClr val="accent1"/>
+            </a:lnRef>
+            <a:fillRef idx="0">
+              <a:schemeClr val="accent1"/>
+            </a:fillRef>
+            <a:effectRef idx="0">
+              <a:schemeClr val="accent1"/>
+            </a:effectRef>
+            <a:fontRef idx="minor">
+              <a:schemeClr val="tx1"/>
+            </a:fontRef>
+          </p:style>
+        </p:cxnSp>
+        <p:cxnSp>
+          <p:nvCxnSpPr>
+            <p:cNvPr id="111" name="Straight Connector 110">
+              <a:extLst>
+                <a:ext uri="{FF2B5EF4-FFF2-40B4-BE49-F238E27FC236}">
+                  <a16:creationId xmlns:a16="http://schemas.microsoft.com/office/drawing/2014/main" id="{82E05456-47AE-42B8-8919-A1E88C29CD3C}"/>
+                </a:ext>
+              </a:extLst>
+            </p:cNvPr>
+            <p:cNvCxnSpPr>
+              <a:cxnSpLocks/>
+            </p:cNvCxnSpPr>
+            <p:nvPr/>
+          </p:nvCxnSpPr>
+          <p:spPr>
+            <a:xfrm flipH="1" flipV="1">
+              <a:off x="2928558" y="2454554"/>
+              <a:ext cx="628609" cy="365760"/>
+            </a:xfrm>
+            <a:prstGeom prst="line">
+              <a:avLst/>
+            </a:prstGeom>
+            <a:ln w="38100">
+              <a:solidFill>
+                <a:schemeClr val="tx1"/>
+              </a:solidFill>
+              <a:headEnd type="triangle" w="med" len="med"/>
+              <a:tailEnd type="none" w="med" len="med"/>
+            </a:ln>
+          </p:spPr>
+          <p:style>
+            <a:lnRef idx="1">
+              <a:schemeClr val="accent1"/>
+            </a:lnRef>
+            <a:fillRef idx="0">
+              <a:schemeClr val="accent1"/>
+            </a:fillRef>
+            <a:effectRef idx="0">
+              <a:schemeClr val="accent1"/>
+            </a:effectRef>
+            <a:fontRef idx="minor">
+              <a:schemeClr val="tx1"/>
+            </a:fontRef>
+          </p:style>
+        </p:cxnSp>
+      </p:grpSp>
+      <p:grpSp>
+        <p:nvGrpSpPr>
+          <p:cNvPr id="112" name="Group 111">
+            <a:extLst>
+              <a:ext uri="{FF2B5EF4-FFF2-40B4-BE49-F238E27FC236}">
+                <a16:creationId xmlns:a16="http://schemas.microsoft.com/office/drawing/2014/main" id="{9CF911E6-5AE8-4C48-A22E-F39CF4B9A728}"/>
+              </a:ext>
+            </a:extLst>
+          </p:cNvPr>
+          <p:cNvGrpSpPr/>
+          <p:nvPr/>
+        </p:nvGrpSpPr>
+        <p:grpSpPr>
+          <a:xfrm>
+            <a:off x="5276891" y="4107007"/>
+            <a:ext cx="909176" cy="1025754"/>
+            <a:chOff x="2916930" y="1931720"/>
+            <a:chExt cx="909176" cy="1025754"/>
+          </a:xfrm>
+        </p:grpSpPr>
+        <p:sp>
+          <p:nvSpPr>
+            <p:cNvPr id="113" name="Oval 112">
+              <a:extLst>
+                <a:ext uri="{FF2B5EF4-FFF2-40B4-BE49-F238E27FC236}">
+                  <a16:creationId xmlns:a16="http://schemas.microsoft.com/office/drawing/2014/main" id="{0A0D3871-29E3-4B4F-B8FC-4C15B3A1406D}"/>
+                </a:ext>
+              </a:extLst>
+            </p:cNvPr>
+            <p:cNvSpPr/>
+            <p:nvPr/>
+          </p:nvSpPr>
+          <p:spPr>
+            <a:xfrm>
+              <a:off x="3551786" y="1931720"/>
+              <a:ext cx="274320" cy="274320"/>
+            </a:xfrm>
+            <a:prstGeom prst="ellipse">
+              <a:avLst/>
+            </a:prstGeom>
+            <a:solidFill>
+              <a:schemeClr val="bg1">
+                <a:lumMod val="75000"/>
+              </a:schemeClr>
+            </a:solidFill>
+            <a:ln w="19050">
+              <a:solidFill>
+                <a:schemeClr val="tx1"/>
+              </a:solidFill>
+            </a:ln>
+          </p:spPr>
+          <p:style>
+            <a:lnRef idx="2">
+              <a:schemeClr val="accent1">
+                <a:shade val="50000"/>
+              </a:schemeClr>
+            </a:lnRef>
+            <a:fillRef idx="1">
+              <a:schemeClr val="accent1"/>
+            </a:fillRef>
+            <a:effectRef idx="0">
+              <a:schemeClr val="accent1"/>
+            </a:effectRef>
+            <a:fontRef idx="minor">
+              <a:schemeClr val="lt1"/>
+            </a:fontRef>
+          </p:style>
+          <p:txBody>
+            <a:bodyPr rtlCol="0" anchor="ctr"/>
+            <a:lstStyle/>
+            <a:p>
+              <a:pPr algn="ctr"/>
+              <a:endParaRPr lang="en-US" sz="1500">
+                <a:latin typeface="Times New Roman" panose="02020603050405020304" pitchFamily="18" charset="0"/>
+                <a:cs typeface="Times New Roman" panose="02020603050405020304" pitchFamily="18" charset="0"/>
+              </a:endParaRPr>
+            </a:p>
+          </p:txBody>
+        </p:sp>
+        <p:sp>
+          <p:nvSpPr>
+            <p:cNvPr id="114" name="Oval 113">
+              <a:extLst>
+                <a:ext uri="{FF2B5EF4-FFF2-40B4-BE49-F238E27FC236}">
+                  <a16:creationId xmlns:a16="http://schemas.microsoft.com/office/drawing/2014/main" id="{19F58A99-705B-416E-9B10-43AA72746FA1}"/>
+                </a:ext>
+              </a:extLst>
+            </p:cNvPr>
+            <p:cNvSpPr/>
+            <p:nvPr/>
+          </p:nvSpPr>
+          <p:spPr>
+            <a:xfrm>
+              <a:off x="3545539" y="2683154"/>
+              <a:ext cx="274320" cy="274320"/>
+            </a:xfrm>
+            <a:prstGeom prst="ellipse">
+              <a:avLst/>
+            </a:prstGeom>
+            <a:solidFill>
+              <a:schemeClr val="tx1"/>
+            </a:solidFill>
+            <a:ln w="19050">
+              <a:solidFill>
+                <a:schemeClr val="tx1"/>
+              </a:solidFill>
+            </a:ln>
+          </p:spPr>
+          <p:style>
+            <a:lnRef idx="2">
+              <a:schemeClr val="accent1">
+                <a:shade val="50000"/>
+              </a:schemeClr>
+            </a:lnRef>
+            <a:fillRef idx="1">
+              <a:schemeClr val="accent1"/>
+            </a:fillRef>
+            <a:effectRef idx="0">
+              <a:schemeClr val="accent1"/>
+            </a:effectRef>
+            <a:fontRef idx="minor">
+              <a:schemeClr val="lt1"/>
+            </a:fontRef>
+          </p:style>
+          <p:txBody>
+            <a:bodyPr rtlCol="0" anchor="ctr"/>
+            <a:lstStyle/>
+            <a:p>
+              <a:pPr algn="ctr"/>
+              <a:endParaRPr lang="en-US" sz="1500">
+                <a:latin typeface="Times New Roman" panose="02020603050405020304" pitchFamily="18" charset="0"/>
+                <a:cs typeface="Times New Roman" panose="02020603050405020304" pitchFamily="18" charset="0"/>
+              </a:endParaRPr>
+            </a:p>
+          </p:txBody>
+        </p:sp>
+        <p:cxnSp>
+          <p:nvCxnSpPr>
+            <p:cNvPr id="115" name="Straight Connector 114">
+              <a:extLst>
+                <a:ext uri="{FF2B5EF4-FFF2-40B4-BE49-F238E27FC236}">
+                  <a16:creationId xmlns:a16="http://schemas.microsoft.com/office/drawing/2014/main" id="{E0B9C6E6-1E15-4069-8E54-F395CF66A66F}"/>
+                </a:ext>
+              </a:extLst>
+            </p:cNvPr>
+            <p:cNvCxnSpPr>
+              <a:cxnSpLocks/>
+            </p:cNvCxnSpPr>
+            <p:nvPr/>
+          </p:nvCxnSpPr>
+          <p:spPr>
+            <a:xfrm flipH="1">
+              <a:off x="2916930" y="2068880"/>
+              <a:ext cx="628609" cy="365760"/>
+            </a:xfrm>
+            <a:prstGeom prst="line">
+              <a:avLst/>
+            </a:prstGeom>
+            <a:ln w="38100">
+              <a:solidFill>
+                <a:schemeClr val="tx1"/>
+              </a:solidFill>
+              <a:headEnd type="triangle" w="med" len="med"/>
+              <a:tailEnd type="none" w="med" len="med"/>
+            </a:ln>
+          </p:spPr>
+          <p:style>
+            <a:lnRef idx="1">
+              <a:schemeClr val="accent1"/>
+            </a:lnRef>
+            <a:fillRef idx="0">
+              <a:schemeClr val="accent1"/>
+            </a:fillRef>
+            <a:effectRef idx="0">
+              <a:schemeClr val="accent1"/>
+            </a:effectRef>
+            <a:fontRef idx="minor">
+              <a:schemeClr val="tx1"/>
+            </a:fontRef>
+          </p:style>
+        </p:cxnSp>
+        <p:cxnSp>
+          <p:nvCxnSpPr>
+            <p:cNvPr id="116" name="Straight Connector 115">
+              <a:extLst>
+                <a:ext uri="{FF2B5EF4-FFF2-40B4-BE49-F238E27FC236}">
+                  <a16:creationId xmlns:a16="http://schemas.microsoft.com/office/drawing/2014/main" id="{B5F00C4D-5E96-4F80-B3E2-15DDCBC8CB97}"/>
+                </a:ext>
+              </a:extLst>
+            </p:cNvPr>
+            <p:cNvCxnSpPr>
+              <a:cxnSpLocks/>
+            </p:cNvCxnSpPr>
+            <p:nvPr/>
+          </p:nvCxnSpPr>
+          <p:spPr>
+            <a:xfrm flipH="1" flipV="1">
+              <a:off x="2928558" y="2454554"/>
+              <a:ext cx="628609" cy="365760"/>
+            </a:xfrm>
+            <a:prstGeom prst="line">
+              <a:avLst/>
+            </a:prstGeom>
+            <a:ln w="38100">
+              <a:solidFill>
+                <a:schemeClr val="tx1"/>
+              </a:solidFill>
+              <a:headEnd type="triangle" w="med" len="med"/>
+              <a:tailEnd type="none" w="med" len="med"/>
+            </a:ln>
+          </p:spPr>
+          <p:style>
+            <a:lnRef idx="1">
+              <a:schemeClr val="accent1"/>
+            </a:lnRef>
+            <a:fillRef idx="0">
+              <a:schemeClr val="accent1"/>
+            </a:fillRef>
+            <a:effectRef idx="0">
+              <a:schemeClr val="accent1"/>
+            </a:effectRef>
+            <a:fontRef idx="minor">
+              <a:schemeClr val="tx1"/>
+            </a:fontRef>
+          </p:style>
+        </p:cxnSp>
+      </p:grpSp>
+      <p:grpSp>
+        <p:nvGrpSpPr>
+          <p:cNvPr id="118" name="Group 117">
+            <a:extLst>
+              <a:ext uri="{FF2B5EF4-FFF2-40B4-BE49-F238E27FC236}">
+                <a16:creationId xmlns:a16="http://schemas.microsoft.com/office/drawing/2014/main" id="{C5F3B323-4491-4BC4-BBFB-E2364F85FEAC}"/>
+              </a:ext>
+            </a:extLst>
+          </p:cNvPr>
+          <p:cNvGrpSpPr/>
+          <p:nvPr/>
+        </p:nvGrpSpPr>
+        <p:grpSpPr>
+          <a:xfrm>
+            <a:off x="5276891" y="5230839"/>
+            <a:ext cx="909176" cy="1025754"/>
+            <a:chOff x="2916930" y="1931720"/>
+            <a:chExt cx="909176" cy="1025754"/>
+          </a:xfrm>
+        </p:grpSpPr>
+        <p:sp>
+          <p:nvSpPr>
+            <p:cNvPr id="119" name="Oval 118">
+              <a:extLst>
+                <a:ext uri="{FF2B5EF4-FFF2-40B4-BE49-F238E27FC236}">
+                  <a16:creationId xmlns:a16="http://schemas.microsoft.com/office/drawing/2014/main" id="{0314B839-B540-420D-B0B2-74C8B295C4EA}"/>
+                </a:ext>
+              </a:extLst>
+            </p:cNvPr>
+            <p:cNvSpPr/>
+            <p:nvPr/>
+          </p:nvSpPr>
+          <p:spPr>
+            <a:xfrm>
+              <a:off x="3551786" y="1931720"/>
+              <a:ext cx="274320" cy="274320"/>
+            </a:xfrm>
+            <a:prstGeom prst="ellipse">
+              <a:avLst/>
+            </a:prstGeom>
+            <a:solidFill>
+              <a:schemeClr val="bg1">
+                <a:lumMod val="75000"/>
+              </a:schemeClr>
+            </a:solidFill>
+            <a:ln w="19050">
+              <a:solidFill>
+                <a:schemeClr val="tx1"/>
+              </a:solidFill>
+            </a:ln>
+          </p:spPr>
+          <p:style>
+            <a:lnRef idx="2">
+              <a:schemeClr val="accent1">
+                <a:shade val="50000"/>
+              </a:schemeClr>
+            </a:lnRef>
+            <a:fillRef idx="1">
+              <a:schemeClr val="accent1"/>
+            </a:fillRef>
+            <a:effectRef idx="0">
+              <a:schemeClr val="accent1"/>
+            </a:effectRef>
+            <a:fontRef idx="minor">
+              <a:schemeClr val="lt1"/>
+            </a:fontRef>
+          </p:style>
+          <p:txBody>
+            <a:bodyPr rtlCol="0" anchor="ctr"/>
+            <a:lstStyle/>
+            <a:p>
+              <a:pPr algn="ctr"/>
+              <a:endParaRPr lang="en-US" sz="1500">
+                <a:latin typeface="Times New Roman" panose="02020603050405020304" pitchFamily="18" charset="0"/>
+                <a:cs typeface="Times New Roman" panose="02020603050405020304" pitchFamily="18" charset="0"/>
+              </a:endParaRPr>
+            </a:p>
+          </p:txBody>
+        </p:sp>
+        <p:sp>
+          <p:nvSpPr>
+            <p:cNvPr id="120" name="Oval 119">
+              <a:extLst>
+                <a:ext uri="{FF2B5EF4-FFF2-40B4-BE49-F238E27FC236}">
+                  <a16:creationId xmlns:a16="http://schemas.microsoft.com/office/drawing/2014/main" id="{0E4C1674-9520-433E-AFB9-BC45BAE420E7}"/>
+                </a:ext>
+              </a:extLst>
+            </p:cNvPr>
+            <p:cNvSpPr/>
+            <p:nvPr/>
+          </p:nvSpPr>
+          <p:spPr>
+            <a:xfrm>
+              <a:off x="3545539" y="2683154"/>
+              <a:ext cx="274320" cy="274320"/>
+            </a:xfrm>
+            <a:prstGeom prst="ellipse">
+              <a:avLst/>
+            </a:prstGeom>
+            <a:solidFill>
+              <a:schemeClr val="tx1"/>
+            </a:solidFill>
+            <a:ln w="19050">
+              <a:solidFill>
+                <a:schemeClr val="tx1"/>
+              </a:solidFill>
+            </a:ln>
+          </p:spPr>
+          <p:style>
+            <a:lnRef idx="2">
+              <a:schemeClr val="accent1">
+                <a:shade val="50000"/>
+              </a:schemeClr>
+            </a:lnRef>
+            <a:fillRef idx="1">
+              <a:schemeClr val="accent1"/>
+            </a:fillRef>
+            <a:effectRef idx="0">
+              <a:schemeClr val="accent1"/>
+            </a:effectRef>
+            <a:fontRef idx="minor">
+              <a:schemeClr val="lt1"/>
+            </a:fontRef>
+          </p:style>
+          <p:txBody>
+            <a:bodyPr rtlCol="0" anchor="ctr"/>
+            <a:lstStyle/>
+            <a:p>
+              <a:pPr algn="ctr"/>
+              <a:endParaRPr lang="en-US" sz="1500">
+                <a:latin typeface="Times New Roman" panose="02020603050405020304" pitchFamily="18" charset="0"/>
+                <a:cs typeface="Times New Roman" panose="02020603050405020304" pitchFamily="18" charset="0"/>
+              </a:endParaRPr>
+            </a:p>
+          </p:txBody>
+        </p:sp>
+        <p:cxnSp>
+          <p:nvCxnSpPr>
+            <p:cNvPr id="121" name="Straight Connector 120">
+              <a:extLst>
+                <a:ext uri="{FF2B5EF4-FFF2-40B4-BE49-F238E27FC236}">
+                  <a16:creationId xmlns:a16="http://schemas.microsoft.com/office/drawing/2014/main" id="{77380639-06E7-43E3-816C-E506B9E06C2A}"/>
+                </a:ext>
+              </a:extLst>
+            </p:cNvPr>
+            <p:cNvCxnSpPr>
+              <a:cxnSpLocks/>
+            </p:cNvCxnSpPr>
+            <p:nvPr/>
+          </p:nvCxnSpPr>
+          <p:spPr>
+            <a:xfrm flipH="1">
+              <a:off x="2916930" y="2068880"/>
+              <a:ext cx="628609" cy="365760"/>
+            </a:xfrm>
+            <a:prstGeom prst="line">
+              <a:avLst/>
+            </a:prstGeom>
+            <a:ln w="38100">
+              <a:solidFill>
+                <a:schemeClr val="tx1"/>
+              </a:solidFill>
+              <a:headEnd type="triangle" w="med" len="med"/>
+              <a:tailEnd type="none" w="med" len="med"/>
+            </a:ln>
+          </p:spPr>
+          <p:style>
+            <a:lnRef idx="1">
+              <a:schemeClr val="accent1"/>
+            </a:lnRef>
+            <a:fillRef idx="0">
+              <a:schemeClr val="accent1"/>
+            </a:fillRef>
+            <a:effectRef idx="0">
+              <a:schemeClr val="accent1"/>
+            </a:effectRef>
+            <a:fontRef idx="minor">
+              <a:schemeClr val="tx1"/>
+            </a:fontRef>
+          </p:style>
+        </p:cxnSp>
+        <p:cxnSp>
+          <p:nvCxnSpPr>
+            <p:cNvPr id="122" name="Straight Connector 121">
+              <a:extLst>
+                <a:ext uri="{FF2B5EF4-FFF2-40B4-BE49-F238E27FC236}">
+                  <a16:creationId xmlns:a16="http://schemas.microsoft.com/office/drawing/2014/main" id="{D5187358-C883-429D-BD63-709C78898927}"/>
+                </a:ext>
+              </a:extLst>
+            </p:cNvPr>
+            <p:cNvCxnSpPr>
+              <a:cxnSpLocks/>
+            </p:cNvCxnSpPr>
+            <p:nvPr/>
+          </p:nvCxnSpPr>
+          <p:spPr>
+            <a:xfrm flipH="1" flipV="1">
+              <a:off x="2928558" y="2454554"/>
+              <a:ext cx="628609" cy="365760"/>
+            </a:xfrm>
+            <a:prstGeom prst="line">
+              <a:avLst/>
+            </a:prstGeom>
+            <a:ln w="38100">
+              <a:solidFill>
+                <a:schemeClr val="tx1"/>
+              </a:solidFill>
+              <a:headEnd type="triangle" w="med" len="med"/>
+              <a:tailEnd type="none" w="med" len="med"/>
+            </a:ln>
+          </p:spPr>
+          <p:style>
+            <a:lnRef idx="1">
+              <a:schemeClr val="accent1"/>
+            </a:lnRef>
+            <a:fillRef idx="0">
+              <a:schemeClr val="accent1"/>
+            </a:fillRef>
+            <a:effectRef idx="0">
+              <a:schemeClr val="accent1"/>
+            </a:effectRef>
+            <a:fontRef idx="minor">
+              <a:schemeClr val="tx1"/>
+            </a:fontRef>
+          </p:style>
+        </p:cxnSp>
+      </p:grpSp>
+      <p:sp>
+        <p:nvSpPr>
+          <p:cNvPr id="124" name="Oval 123">
+            <a:extLst>
+              <a:ext uri="{FF2B5EF4-FFF2-40B4-BE49-F238E27FC236}">
+                <a16:creationId xmlns:a16="http://schemas.microsoft.com/office/drawing/2014/main" id="{753D1CF2-E3F0-4496-8D36-CF6176871604}"/>
+              </a:ext>
+            </a:extLst>
+          </p:cNvPr>
+          <p:cNvSpPr/>
+          <p:nvPr/>
+        </p:nvSpPr>
+        <p:spPr>
+          <a:xfrm>
+            <a:off x="5014199" y="4478989"/>
+            <a:ext cx="274320" cy="274320"/>
+          </a:xfrm>
+          <a:prstGeom prst="ellipse">
+            <a:avLst/>
+          </a:prstGeom>
+          <a:solidFill>
+            <a:schemeClr val="bg1">
+              <a:lumMod val="75000"/>
+            </a:schemeClr>
+          </a:solidFill>
+          <a:ln w="19050">
+            <a:solidFill>
+              <a:schemeClr val="tx1"/>
+            </a:solidFill>
+          </a:ln>
+        </p:spPr>
+        <p:style>
+          <a:lnRef idx="2">
+            <a:schemeClr val="accent1">
+              <a:shade val="50000"/>
+            </a:schemeClr>
+          </a:lnRef>
+          <a:fillRef idx="1">
+            <a:schemeClr val="accent1"/>
+          </a:fillRef>
+          <a:effectRef idx="0">
+            <a:schemeClr val="accent1"/>
+          </a:effectRef>
+          <a:fontRef idx="minor">
+            <a:schemeClr val="lt1"/>
+          </a:fontRef>
+        </p:style>
+        <p:txBody>
+          <a:bodyPr rtlCol="0" anchor="ctr"/>
+          <a:lstStyle/>
+          <a:p>
+            <a:pPr algn="ctr"/>
+            <a:endParaRPr lang="en-US" sz="1500">
+              <a:latin typeface="Times New Roman" panose="02020603050405020304" pitchFamily="18" charset="0"/>
+              <a:cs typeface="Times New Roman" panose="02020603050405020304" pitchFamily="18" charset="0"/>
+            </a:endParaRPr>
+          </a:p>
+        </p:txBody>
+      </p:sp>
+      <p:sp>
+        <p:nvSpPr>
+          <p:cNvPr id="125" name="Oval 124">
+            <a:extLst>
+              <a:ext uri="{FF2B5EF4-FFF2-40B4-BE49-F238E27FC236}">
+                <a16:creationId xmlns:a16="http://schemas.microsoft.com/office/drawing/2014/main" id="{4935330A-67AD-4E73-B1A6-60C84C45FB93}"/>
+              </a:ext>
+            </a:extLst>
+          </p:cNvPr>
+          <p:cNvSpPr/>
+          <p:nvPr/>
+        </p:nvSpPr>
+        <p:spPr>
+          <a:xfrm>
+            <a:off x="5014199" y="5606556"/>
+            <a:ext cx="274320" cy="274320"/>
+          </a:xfrm>
+          <a:prstGeom prst="ellipse">
+            <a:avLst/>
+          </a:prstGeom>
+          <a:solidFill>
+            <a:srgbClr val="000000"/>
+          </a:solidFill>
+          <a:ln w="19050">
+            <a:solidFill>
+              <a:schemeClr val="tx1"/>
+            </a:solidFill>
+          </a:ln>
+        </p:spPr>
+        <p:style>
+          <a:lnRef idx="2">
+            <a:schemeClr val="accent1">
+              <a:shade val="50000"/>
+            </a:schemeClr>
+          </a:lnRef>
+          <a:fillRef idx="1">
+            <a:schemeClr val="accent1"/>
+          </a:fillRef>
+          <a:effectRef idx="0">
+            <a:schemeClr val="accent1"/>
+          </a:effectRef>
+          <a:fontRef idx="minor">
+            <a:schemeClr val="lt1"/>
+          </a:fontRef>
+        </p:style>
+        <p:txBody>
+          <a:bodyPr rtlCol="0" anchor="ctr"/>
+          <a:lstStyle/>
+          <a:p>
+            <a:pPr algn="ctr"/>
+            <a:endParaRPr lang="en-US" sz="1500">
+              <a:latin typeface="Times New Roman" panose="02020603050405020304" pitchFamily="18" charset="0"/>
+              <a:cs typeface="Times New Roman" panose="02020603050405020304" pitchFamily="18" charset="0"/>
+            </a:endParaRPr>
+          </a:p>
+        </p:txBody>
+      </p:sp>
+      <p:cxnSp>
+        <p:nvCxnSpPr>
+          <p:cNvPr id="126" name="Straight Connector 125">
+            <a:extLst>
+              <a:ext uri="{FF2B5EF4-FFF2-40B4-BE49-F238E27FC236}">
+                <a16:creationId xmlns:a16="http://schemas.microsoft.com/office/drawing/2014/main" id="{940F9225-38B2-4F5D-800D-7BF65F306987}"/>
+              </a:ext>
+            </a:extLst>
+          </p:cNvPr>
+          <p:cNvCxnSpPr>
+            <a:cxnSpLocks/>
+          </p:cNvCxnSpPr>
+          <p:nvPr/>
+        </p:nvCxnSpPr>
+        <p:spPr>
+          <a:xfrm flipH="1" flipV="1">
+            <a:off x="4397218" y="5192256"/>
+            <a:ext cx="628609" cy="548640"/>
+          </a:xfrm>
+          <a:prstGeom prst="line">
+            <a:avLst/>
+          </a:prstGeom>
+          <a:ln w="38100">
+            <a:solidFill>
+              <a:schemeClr val="tx1"/>
+            </a:solidFill>
+            <a:headEnd type="triangle" w="med" len="med"/>
+            <a:tailEnd type="none" w="med" len="med"/>
+          </a:ln>
+        </p:spPr>
+        <p:style>
+          <a:lnRef idx="1">
+            <a:schemeClr val="accent1"/>
+          </a:lnRef>
+          <a:fillRef idx="0">
+            <a:schemeClr val="accent1"/>
+          </a:fillRef>
+          <a:effectRef idx="0">
+            <a:schemeClr val="accent1"/>
+          </a:effectRef>
+          <a:fontRef idx="minor">
+            <a:schemeClr val="tx1"/>
+          </a:fontRef>
+        </p:style>
+      </p:cxnSp>
+      <p:cxnSp>
+        <p:nvCxnSpPr>
+          <p:cNvPr id="128" name="Straight Connector 127">
+            <a:extLst>
+              <a:ext uri="{FF2B5EF4-FFF2-40B4-BE49-F238E27FC236}">
+                <a16:creationId xmlns:a16="http://schemas.microsoft.com/office/drawing/2014/main" id="{D86CA34C-CB34-498C-844F-4C6C9EBBC5BB}"/>
+              </a:ext>
+            </a:extLst>
+          </p:cNvPr>
+          <p:cNvCxnSpPr>
+            <a:cxnSpLocks/>
+          </p:cNvCxnSpPr>
+          <p:nvPr/>
+        </p:nvCxnSpPr>
+        <p:spPr>
+          <a:xfrm flipH="1">
+            <a:off x="4385590" y="4607044"/>
+            <a:ext cx="628609" cy="548640"/>
+          </a:xfrm>
+          <a:prstGeom prst="line">
+            <a:avLst/>
+          </a:prstGeom>
+          <a:ln w="38100">
+            <a:solidFill>
+              <a:schemeClr val="tx1"/>
+            </a:solidFill>
+            <a:headEnd type="triangle" w="med" len="med"/>
+            <a:tailEnd type="none" w="med" len="med"/>
+          </a:ln>
+        </p:spPr>
+        <p:style>
+          <a:lnRef idx="1">
+            <a:schemeClr val="accent1"/>
+          </a:lnRef>
+          <a:fillRef idx="0">
+            <a:schemeClr val="accent1"/>
+          </a:fillRef>
+          <a:effectRef idx="0">
+            <a:schemeClr val="accent1"/>
+          </a:effectRef>
+          <a:fontRef idx="minor">
+            <a:schemeClr val="tx1"/>
+          </a:fontRef>
+        </p:style>
+      </p:cxnSp>
+      <p:sp>
+        <p:nvSpPr>
+          <p:cNvPr id="129" name="Oval 128">
+            <a:extLst>
+              <a:ext uri="{FF2B5EF4-FFF2-40B4-BE49-F238E27FC236}">
+                <a16:creationId xmlns:a16="http://schemas.microsoft.com/office/drawing/2014/main" id="{0B8742AF-A34E-42AF-8E8A-11641F0379E8}"/>
+              </a:ext>
+            </a:extLst>
+          </p:cNvPr>
+          <p:cNvSpPr/>
+          <p:nvPr/>
+        </p:nvSpPr>
+        <p:spPr>
+          <a:xfrm>
+            <a:off x="4122898" y="5024480"/>
+            <a:ext cx="274320" cy="274320"/>
+          </a:xfrm>
+          <a:prstGeom prst="ellipse">
+            <a:avLst/>
+          </a:prstGeom>
+          <a:solidFill>
+            <a:srgbClr val="000000"/>
+          </a:solidFill>
+          <a:ln w="19050">
+            <a:solidFill>
+              <a:schemeClr val="tx1"/>
+            </a:solidFill>
+          </a:ln>
+        </p:spPr>
+        <p:style>
+          <a:lnRef idx="2">
+            <a:schemeClr val="accent1">
+              <a:shade val="50000"/>
+            </a:schemeClr>
+          </a:lnRef>
+          <a:fillRef idx="1">
+            <a:schemeClr val="accent1"/>
+          </a:fillRef>
+          <a:effectRef idx="0">
+            <a:schemeClr val="accent1"/>
+          </a:effectRef>
+          <a:fontRef idx="minor">
+            <a:schemeClr val="lt1"/>
+          </a:fontRef>
+        </p:style>
+        <p:txBody>
+          <a:bodyPr rtlCol="0" anchor="ctr"/>
+          <a:lstStyle/>
+          <a:p>
+            <a:pPr algn="ctr"/>
+            <a:endParaRPr lang="en-US" sz="1500">
+              <a:latin typeface="Times New Roman" panose="02020603050405020304" pitchFamily="18" charset="0"/>
+              <a:cs typeface="Times New Roman" panose="02020603050405020304" pitchFamily="18" charset="0"/>
+            </a:endParaRPr>
+          </a:p>
+        </p:txBody>
+      </p:sp>
+      <p:sp>
+        <p:nvSpPr>
+          <p:cNvPr id="130" name="Oval 129">
+            <a:extLst>
+              <a:ext uri="{FF2B5EF4-FFF2-40B4-BE49-F238E27FC236}">
+                <a16:creationId xmlns:a16="http://schemas.microsoft.com/office/drawing/2014/main" id="{768818CE-7EAF-418F-9822-92AE8FEF07CA}"/>
+              </a:ext>
+            </a:extLst>
+          </p:cNvPr>
+          <p:cNvSpPr/>
+          <p:nvPr/>
+        </p:nvSpPr>
+        <p:spPr>
+          <a:xfrm>
+            <a:off x="4105272" y="2792867"/>
+            <a:ext cx="274320" cy="274320"/>
+          </a:xfrm>
+          <a:prstGeom prst="ellipse">
+            <a:avLst/>
+          </a:prstGeom>
+          <a:solidFill>
+            <a:schemeClr val="bg1">
+              <a:lumMod val="75000"/>
+            </a:schemeClr>
+          </a:solidFill>
+          <a:ln w="19050">
+            <a:solidFill>
+              <a:schemeClr val="tx1"/>
+            </a:solidFill>
+          </a:ln>
+        </p:spPr>
+        <p:style>
+          <a:lnRef idx="2">
+            <a:schemeClr val="accent1">
+              <a:shade val="50000"/>
+            </a:schemeClr>
+          </a:lnRef>
+          <a:fillRef idx="1">
+            <a:schemeClr val="accent1"/>
+          </a:fillRef>
+          <a:effectRef idx="0">
+            <a:schemeClr val="accent1"/>
+          </a:effectRef>
+          <a:fontRef idx="minor">
+            <a:schemeClr val="lt1"/>
+          </a:fontRef>
+        </p:style>
+        <p:txBody>
+          <a:bodyPr rtlCol="0" anchor="ctr"/>
+          <a:lstStyle/>
+          <a:p>
+            <a:pPr algn="ctr"/>
+            <a:endParaRPr lang="en-US" sz="1500">
+              <a:latin typeface="Times New Roman" panose="02020603050405020304" pitchFamily="18" charset="0"/>
+              <a:cs typeface="Times New Roman" panose="02020603050405020304" pitchFamily="18" charset="0"/>
+            </a:endParaRPr>
+          </a:p>
+        </p:txBody>
+      </p:sp>
+    </p:spTree>
+    <p:extLst>
+      <p:ext uri="{BB962C8B-B14F-4D97-AF65-F5344CB8AC3E}">
+        <p14:creationId xmlns:p14="http://schemas.microsoft.com/office/powerpoint/2010/main" val="1372377695"/>
+      </p:ext>
+    </p:extLst>
+  </p:cSld>
+  <p:clrMapOvr>
+    <a:masterClrMapping/>
+  </p:clrMapOvr>
+</p:sld>
+</file>
+
+<file path=ppt/slides/slide2.xml><?xml version="1.0" encoding="utf-8"?>
 <p:sld xmlns:a="http://schemas.openxmlformats.org/drawingml/2006/main" xmlns:r="http://schemas.openxmlformats.org/officeDocument/2006/relationships" xmlns:p="http://schemas.openxmlformats.org/presentationml/2006/main">
   <p:cSld>
     <p:spTree>
@@ -3486,7 +5732,7 @@
         <p:spPr>
           <a:xfrm>
             <a:off x="3864299" y="7185802"/>
-            <a:ext cx="2231701" cy="1156086"/>
+            <a:ext cx="2098651" cy="1156086"/>
           </a:xfrm>
           <a:prstGeom prst="rect">
             <a:avLst/>
@@ -3509,7 +5755,7 @@
                 <a:latin typeface="Times New Roman" panose="02020603050405020304" pitchFamily="18" charset="0"/>
                 <a:cs typeface="Times New Roman" panose="02020603050405020304" pitchFamily="18" charset="0"/>
               </a:rPr>
-              <a:t>Current investment costs</a:t>
+              <a:t>Current capital costs</a:t>
             </a:r>
           </a:p>
           <a:p>
@@ -5251,7 +7497,7 @@
 </p:sld>
 </file>
 
-<file path=ppt/slides/slide2.xml><?xml version="1.0" encoding="utf-8"?>
+<file path=ppt/slides/slide3.xml><?xml version="1.0" encoding="utf-8"?>
 <p:sld xmlns:a="http://schemas.openxmlformats.org/drawingml/2006/main" xmlns:r="http://schemas.openxmlformats.org/officeDocument/2006/relationships" xmlns:p="http://schemas.openxmlformats.org/presentationml/2006/main">
   <p:cSld>
     <p:spTree>

</xml_diff>